<commit_message>
edited slides for clarity
</commit_message>
<xml_diff>
--- a/slides/Project 1 - Connect Four (Ernest).pptx
+++ b/slides/Project 1 - Connect Four (Ernest).pptx
@@ -5445,7 +5445,7 @@
       </p:sp>
       <p:sp>
         <p:nvSpPr>
-          <p:cNvPr id="235" name="Scenario 3: Diagonal (Upwards) ( / )"/>
+          <p:cNvPr id="235" name="Scenario 3: Diagonal (Up-Right) ( / )"/>
           <p:cNvSpPr txBox="1"/>
           <p:nvPr>
             <p:ph type="body" idx="21"/>
@@ -5467,7 +5467,7 @@
           <a:p>
             <a:pPr/>
             <a:r>
-              <a:t>Scenario 3: Diagonal (Upwards) ( / )</a:t>
+              <a:t>Scenario 3: Diagonal (Up-Right) ( / )</a:t>
             </a:r>
           </a:p>
         </p:txBody>
@@ -5983,7 +5983,7 @@
       </p:sp>
       <p:sp>
         <p:nvSpPr>
-          <p:cNvPr id="247" name="Scenario 4: Diagonal (Downwards) ( \ )"/>
+          <p:cNvPr id="247" name="Scenario 4: Diagonal (Down-Right) ( \ )"/>
           <p:cNvSpPr txBox="1"/>
           <p:nvPr>
             <p:ph type="body" idx="21"/>
@@ -6005,7 +6005,7 @@
           <a:p>
             <a:pPr/>
             <a:r>
-              <a:t>Scenario 4: Diagonal (Downwards) ( \ )</a:t>
+              <a:t>Scenario 4: Diagonal (Down-Right) ( \ )</a:t>
             </a:r>
           </a:p>
         </p:txBody>
@@ -9605,7 +9605,7 @@
       </p:pic>
       <p:sp>
         <p:nvSpPr>
-          <p:cNvPr id="198" name="Horizontal…"/>
+          <p:cNvPr id="198" name="Horizontal ( — )…"/>
           <p:cNvSpPr txBox="1"/>
           <p:nvPr>
             <p:ph type="body" idx="1"/>
@@ -9622,25 +9622,25 @@
           <a:p>
             <a:pPr/>
             <a:r>
-              <a:t>Horizontal </a:t>
-            </a:r>
-          </a:p>
-          <a:p>
-            <a:pPr/>
-            <a:r>
-              <a:t>Vertical</a:t>
-            </a:r>
-          </a:p>
-          <a:p>
-            <a:pPr/>
-            <a:r>
-              <a:t>Diagonal (upwards)</a:t>
-            </a:r>
-          </a:p>
-          <a:p>
-            <a:pPr/>
-            <a:r>
-              <a:t>Diagonal (downwards)</a:t>
+              <a:t>Horizontal ( — )</a:t>
+            </a:r>
+          </a:p>
+          <a:p>
+            <a:pPr/>
+            <a:r>
+              <a:t>Vertical ( | )</a:t>
+            </a:r>
+          </a:p>
+          <a:p>
+            <a:pPr/>
+            <a:r>
+              <a:t>Diagonal ( / )</a:t>
+            </a:r>
+          </a:p>
+          <a:p>
+            <a:pPr/>
+            <a:r>
+              <a:t>Diagonal ( \ )</a:t>
             </a:r>
           </a:p>
         </p:txBody>

</xml_diff>